<commit_message>
KMeans got too big, plotly crashed another notebook - final final push
</commit_message>
<xml_diff>
--- a/deliverables/capstone_KH.pptx
+++ b/deliverables/capstone_KH.pptx
@@ -5,7 +5,7 @@
     <p:sldMasterId id="2147483716" r:id="rId1"/>
   </p:sldMasterIdLst>
   <p:notesMasterIdLst>
-    <p:notesMasterId r:id="rId23"/>
+    <p:notesMasterId r:id="rId25"/>
   </p:notesMasterIdLst>
   <p:sldIdLst>
     <p:sldId id="256" r:id="rId2"/>
@@ -25,24 +25,26 @@
     <p:sldId id="268" r:id="rId16"/>
     <p:sldId id="292" r:id="rId17"/>
     <p:sldId id="291" r:id="rId18"/>
-    <p:sldId id="294" r:id="rId19"/>
-    <p:sldId id="258" r:id="rId20"/>
-    <p:sldId id="293" r:id="rId21"/>
-    <p:sldId id="267" r:id="rId22"/>
+    <p:sldId id="297" r:id="rId19"/>
+    <p:sldId id="296" r:id="rId20"/>
+    <p:sldId id="294" r:id="rId21"/>
+    <p:sldId id="258" r:id="rId22"/>
+    <p:sldId id="293" r:id="rId23"/>
+    <p:sldId id="267" r:id="rId24"/>
   </p:sldIdLst>
   <p:sldSz cx="9144000" cy="5143500" type="screen16x9"/>
   <p:notesSz cx="6858000" cy="9144000"/>
   <p:embeddedFontLst>
     <p:embeddedFont>
       <p:font typeface="Average" panose="02000503040000020003" pitchFamily="2" charset="77"/>
-      <p:regular r:id="rId24"/>
+      <p:regular r:id="rId26"/>
     </p:embeddedFont>
     <p:embeddedFont>
       <p:font typeface="Gill Sans MT" panose="020B0502020104020203" pitchFamily="34" charset="77"/>
-      <p:regular r:id="rId25"/>
-      <p:bold r:id="rId26"/>
-      <p:italic r:id="rId27"/>
-      <p:boldItalic r:id="rId28"/>
+      <p:regular r:id="rId27"/>
+      <p:bold r:id="rId28"/>
+      <p:italic r:id="rId29"/>
+      <p:boldItalic r:id="rId30"/>
     </p:embeddedFont>
   </p:embeddedFontLst>
   <p:defaultTextStyle>
@@ -5265,82 +5267,42 @@
             </a:pPr>
             <a:r>
               <a:rPr lang="en-US" dirty="0"/>
-              <a:t>Including </a:t>
-            </a:r>
-            <a:r>
-              <a:rPr lang="en-US" dirty="0" err="1"/>
-              <a:t>unemployment_rate</a:t>
-            </a:r>
+              <a:t>SIL score 0.732 – these are very distinct clusters, making this a good model to target different areas with different interventions</a:t>
+            </a:r>
+          </a:p>
+          <a:p>
+            <a:pPr marL="0" lvl="0" indent="0" algn="l" rtl="0">
+              <a:spcBef>
+                <a:spcPts val="0"/>
+              </a:spcBef>
+              <a:spcAft>
+                <a:spcPts val="0"/>
+              </a:spcAft>
+              <a:buNone/>
+            </a:pPr>
+            <a:endParaRPr lang="en-US" dirty="0"/>
+          </a:p>
+          <a:p>
+            <a:pPr marL="0" lvl="0" indent="0" algn="l" rtl="0">
+              <a:spcBef>
+                <a:spcPts val="0"/>
+              </a:spcBef>
+              <a:spcAft>
+                <a:spcPts val="0"/>
+              </a:spcAft>
+              <a:buNone/>
+            </a:pPr>
             <a:r>
               <a:rPr lang="en-US" dirty="0"/>
-              <a:t> but not labor force returned a drastically lower silhouette score – suggesting that perhaps these related groups can be better categorized if you look at the size of the </a:t>
-            </a:r>
-            <a:r>
-              <a:rPr lang="en-US" dirty="0" err="1"/>
-              <a:t>labor_force</a:t>
-            </a:r>
-            <a:r>
-              <a:rPr lang="en-US" dirty="0"/>
-              <a:t> (itself a function of a county’s total population), rather than just unemployment alone</a:t>
-            </a:r>
-          </a:p>
-          <a:p>
-            <a:pPr marL="0" lvl="0" indent="0" algn="l" rtl="0">
-              <a:spcBef>
-                <a:spcPts val="0"/>
-              </a:spcBef>
-              <a:spcAft>
-                <a:spcPts val="0"/>
-              </a:spcAft>
-              <a:buNone/>
-            </a:pPr>
-            <a:endParaRPr lang="en-US" dirty="0"/>
-          </a:p>
-          <a:p>
-            <a:pPr marL="0" lvl="0" indent="0" algn="l" rtl="0">
-              <a:spcBef>
-                <a:spcPts val="0"/>
-              </a:spcBef>
-              <a:spcAft>
-                <a:spcPts val="0"/>
-              </a:spcAft>
-              <a:buNone/>
-            </a:pPr>
-            <a:r>
-              <a:rPr lang="en-US" dirty="0"/>
-              <a:t>This would yield itself well to an urban/suburban/rural classification, although I could not find yearly classifications that fit my data for that</a:t>
-            </a:r>
-          </a:p>
-          <a:p>
-            <a:pPr marL="0" lvl="0" indent="0" algn="l" rtl="0">
-              <a:spcBef>
-                <a:spcPts val="0"/>
-              </a:spcBef>
-              <a:spcAft>
-                <a:spcPts val="0"/>
-              </a:spcAft>
-              <a:buNone/>
-            </a:pPr>
-            <a:endParaRPr lang="en-US" dirty="0"/>
-          </a:p>
-          <a:p>
-            <a:pPr marL="0" lvl="0" indent="0" algn="l" rtl="0">
-              <a:spcBef>
-                <a:spcPts val="0"/>
-              </a:spcBef>
-              <a:spcAft>
-                <a:spcPts val="0"/>
-              </a:spcAft>
-              <a:buNone/>
-            </a:pPr>
-            <a:endParaRPr lang="en-US" dirty="0"/>
+              <a:t>Actually better than the 10 clusters with prop binge</a:t>
+            </a:r>
           </a:p>
         </p:txBody>
       </p:sp>
     </p:spTree>
     <p:extLst>
       <p:ext uri="{BB962C8B-B14F-4D97-AF65-F5344CB8AC3E}">
-        <p14:creationId xmlns:p14="http://schemas.microsoft.com/office/powerpoint/2010/main" val="276609703"/>
+        <p14:creationId xmlns:p14="http://schemas.microsoft.com/office/powerpoint/2010/main" val="577332008"/>
       </p:ext>
     </p:extLst>
   </p:cSld>
@@ -5442,11 +5404,89 @@
               </a:spcAft>
               <a:buNone/>
             </a:pPr>
+            <a:r>
+              <a:rPr lang="en-US" dirty="0"/>
+              <a:t>Including </a:t>
+            </a:r>
+            <a:r>
+              <a:rPr lang="en-US" dirty="0" err="1"/>
+              <a:t>unemployment_rate</a:t>
+            </a:r>
+            <a:r>
+              <a:rPr lang="en-US" dirty="0"/>
+              <a:t> but not labor force returned a drastically lower silhouette score – suggesting that perhaps these related groups can be better categorized if you look at the size of the </a:t>
+            </a:r>
+            <a:r>
+              <a:rPr lang="en-US" dirty="0" err="1"/>
+              <a:t>labor_force</a:t>
+            </a:r>
+            <a:r>
+              <a:rPr lang="en-US" dirty="0"/>
+              <a:t> (itself a function of a county’s total population), rather than just unemployment alone</a:t>
+            </a:r>
+          </a:p>
+          <a:p>
+            <a:pPr marL="0" lvl="0" indent="0" algn="l" rtl="0">
+              <a:spcBef>
+                <a:spcPts val="0"/>
+              </a:spcBef>
+              <a:spcAft>
+                <a:spcPts val="0"/>
+              </a:spcAft>
+              <a:buNone/>
+            </a:pPr>
             <a:endParaRPr lang="en-US" dirty="0"/>
           </a:p>
+          <a:p>
+            <a:pPr marL="0" lvl="0" indent="0" algn="l" rtl="0">
+              <a:spcBef>
+                <a:spcPts val="0"/>
+              </a:spcBef>
+              <a:spcAft>
+                <a:spcPts val="0"/>
+              </a:spcAft>
+              <a:buNone/>
+            </a:pPr>
+            <a:r>
+              <a:rPr lang="en-US" dirty="0"/>
+              <a:t>This would yield itself well to an urban/suburban/rural classification, although I could not find yearly classifications that fit my data for that</a:t>
+            </a:r>
+          </a:p>
+          <a:p>
+            <a:pPr marL="0" lvl="0" indent="0" algn="l" rtl="0">
+              <a:spcBef>
+                <a:spcPts val="0"/>
+              </a:spcBef>
+              <a:spcAft>
+                <a:spcPts val="0"/>
+              </a:spcAft>
+              <a:buNone/>
+            </a:pPr>
+            <a:endParaRPr lang="en-US" dirty="0"/>
+          </a:p>
+          <a:p>
+            <a:pPr marL="0" lvl="0" indent="0" algn="l" rtl="0">
+              <a:spcBef>
+                <a:spcPts val="0"/>
+              </a:spcBef>
+              <a:spcAft>
+                <a:spcPts val="0"/>
+              </a:spcAft>
+              <a:buNone/>
+            </a:pPr>
+            <a:r>
+              <a:rPr lang="en-US" dirty="0"/>
+              <a:t>SIL score 0.876</a:t>
+            </a:r>
+          </a:p>
         </p:txBody>
       </p:sp>
     </p:spTree>
+    <p:extLst>
+      <p:ext uri="{BB962C8B-B14F-4D97-AF65-F5344CB8AC3E}">
+        <p14:creationId xmlns:p14="http://schemas.microsoft.com/office/powerpoint/2010/main" val="3285759855"/>
+      </p:ext>
+    </p:extLst>
   </p:cSld>
   <p:clrMapOvr>
     <a:masterClrMapping/>
@@ -5714,6 +5754,316 @@
               </a:spcAft>
               <a:buNone/>
             </a:pPr>
+            <a:r>
+              <a:rPr lang="en-US" dirty="0"/>
+              <a:t>Including </a:t>
+            </a:r>
+            <a:r>
+              <a:rPr lang="en-US" dirty="0" err="1"/>
+              <a:t>unemployment_rate</a:t>
+            </a:r>
+            <a:r>
+              <a:rPr lang="en-US" dirty="0"/>
+              <a:t> but not labor force returned a drastically lower silhouette score – suggesting that perhaps these related groups can be better categorized if you look at the size of the </a:t>
+            </a:r>
+            <a:r>
+              <a:rPr lang="en-US" dirty="0" err="1"/>
+              <a:t>labor_force</a:t>
+            </a:r>
+            <a:r>
+              <a:rPr lang="en-US" dirty="0"/>
+              <a:t> (itself a function of a county’s total population), rather than just unemployment alone</a:t>
+            </a:r>
+          </a:p>
+          <a:p>
+            <a:pPr marL="0" lvl="0" indent="0" algn="l" rtl="0">
+              <a:spcBef>
+                <a:spcPts val="0"/>
+              </a:spcBef>
+              <a:spcAft>
+                <a:spcPts val="0"/>
+              </a:spcAft>
+              <a:buNone/>
+            </a:pPr>
+            <a:endParaRPr lang="en-US" dirty="0"/>
+          </a:p>
+          <a:p>
+            <a:pPr marL="0" lvl="0" indent="0" algn="l" rtl="0">
+              <a:spcBef>
+                <a:spcPts val="0"/>
+              </a:spcBef>
+              <a:spcAft>
+                <a:spcPts val="0"/>
+              </a:spcAft>
+              <a:buNone/>
+            </a:pPr>
+            <a:r>
+              <a:rPr lang="en-US" dirty="0"/>
+              <a:t>This would yield itself well to an urban/suburban/rural classification, although I could not find yearly classifications that fit my data for that</a:t>
+            </a:r>
+          </a:p>
+          <a:p>
+            <a:pPr marL="0" lvl="0" indent="0" algn="l" rtl="0">
+              <a:spcBef>
+                <a:spcPts val="0"/>
+              </a:spcBef>
+              <a:spcAft>
+                <a:spcPts val="0"/>
+              </a:spcAft>
+              <a:buNone/>
+            </a:pPr>
+            <a:endParaRPr lang="en-US" dirty="0"/>
+          </a:p>
+          <a:p>
+            <a:pPr marL="0" lvl="0" indent="0" algn="l" rtl="0">
+              <a:spcBef>
+                <a:spcPts val="0"/>
+              </a:spcBef>
+              <a:spcAft>
+                <a:spcPts val="0"/>
+              </a:spcAft>
+              <a:buNone/>
+            </a:pPr>
+            <a:r>
+              <a:rPr lang="en-US" dirty="0"/>
+              <a:t>SIL Score 0.638</a:t>
+            </a:r>
+          </a:p>
+          <a:p>
+            <a:pPr marL="0" lvl="0" indent="0" algn="l" rtl="0">
+              <a:spcBef>
+                <a:spcPts val="0"/>
+              </a:spcBef>
+              <a:spcAft>
+                <a:spcPts val="0"/>
+              </a:spcAft>
+              <a:buNone/>
+            </a:pPr>
+            <a:endParaRPr lang="en-US" dirty="0"/>
+          </a:p>
+          <a:p>
+            <a:pPr marL="0" lvl="0" indent="0" algn="l" rtl="0">
+              <a:spcBef>
+                <a:spcPts val="0"/>
+              </a:spcBef>
+              <a:spcAft>
+                <a:spcPts val="0"/>
+              </a:spcAft>
+              <a:buNone/>
+            </a:pPr>
+            <a:endParaRPr lang="en-US" dirty="0"/>
+          </a:p>
+        </p:txBody>
+      </p:sp>
+    </p:spTree>
+    <p:extLst>
+      <p:ext uri="{BB962C8B-B14F-4D97-AF65-F5344CB8AC3E}">
+        <p14:creationId xmlns:p14="http://schemas.microsoft.com/office/powerpoint/2010/main" val="276609703"/>
+      </p:ext>
+    </p:extLst>
+  </p:cSld>
+  <p:clrMapOvr>
+    <a:masterClrMapping/>
+  </p:clrMapOvr>
+</p:notes>
+</file>
+
+<file path=ppt/notesSlides/notesSlide21.xml><?xml version="1.0" encoding="utf-8"?>
+<p:notes xmlns:a="http://schemas.openxmlformats.org/drawingml/2006/main" xmlns:r="http://schemas.openxmlformats.org/officeDocument/2006/relationships" xmlns:p="http://schemas.openxmlformats.org/presentationml/2006/main" showMasterSp="0" showMasterPhAnim="0">
+  <p:cSld>
+    <p:spTree>
+      <p:nvGrpSpPr>
+        <p:cNvPr id="1" name="Shape 67"/>
+        <p:cNvGrpSpPr/>
+        <p:nvPr/>
+      </p:nvGrpSpPr>
+      <p:grpSpPr>
+        <a:xfrm>
+          <a:off x="0" y="0"/>
+          <a:ext cx="0" cy="0"/>
+          <a:chOff x="0" y="0"/>
+          <a:chExt cx="0" cy="0"/>
+        </a:xfrm>
+      </p:grpSpPr>
+      <p:sp>
+        <p:nvSpPr>
+          <p:cNvPr id="68" name="Google Shape;68;gc6f980f91_0_48:notes"/>
+          <p:cNvSpPr>
+            <a:spLocks noGrp="1" noRot="1" noChangeAspect="1"/>
+          </p:cNvSpPr>
+          <p:nvPr>
+            <p:ph type="sldImg" idx="2"/>
+          </p:nvPr>
+        </p:nvSpPr>
+        <p:spPr>
+          <a:xfrm>
+            <a:off x="381000" y="685800"/>
+            <a:ext cx="6096000" cy="3429000"/>
+          </a:xfrm>
+          <a:custGeom>
+            <a:avLst/>
+            <a:gdLst/>
+            <a:ahLst/>
+            <a:cxnLst/>
+            <a:rect l="l" t="t" r="r" b="b"/>
+            <a:pathLst>
+              <a:path w="120000" h="120000" extrusionOk="0">
+                <a:moveTo>
+                  <a:pt x="0" y="0"/>
+                </a:moveTo>
+                <a:lnTo>
+                  <a:pt x="120000" y="0"/>
+                </a:lnTo>
+                <a:lnTo>
+                  <a:pt x="120000" y="120000"/>
+                </a:lnTo>
+                <a:lnTo>
+                  <a:pt x="0" y="120000"/>
+                </a:lnTo>
+                <a:close/>
+              </a:path>
+            </a:pathLst>
+          </a:custGeom>
+        </p:spPr>
+      </p:sp>
+      <p:sp>
+        <p:nvSpPr>
+          <p:cNvPr id="69" name="Google Shape;69;gc6f980f91_0_48:notes"/>
+          <p:cNvSpPr txBox="1">
+            <a:spLocks noGrp="1"/>
+          </p:cNvSpPr>
+          <p:nvPr>
+            <p:ph type="body" idx="1"/>
+          </p:nvPr>
+        </p:nvSpPr>
+        <p:spPr>
+          <a:xfrm>
+            <a:off x="685800" y="4343400"/>
+            <a:ext cx="5486400" cy="4114800"/>
+          </a:xfrm>
+          <a:prstGeom prst="rect">
+            <a:avLst/>
+          </a:prstGeom>
+        </p:spPr>
+        <p:txBody>
+          <a:bodyPr spcFirstLastPara="1" wrap="square" lIns="91425" tIns="91425" rIns="91425" bIns="91425" anchor="t" anchorCtr="0">
+            <a:noAutofit/>
+          </a:bodyPr>
+          <a:lstStyle/>
+          <a:p>
+            <a:pPr marL="0" lvl="0" indent="0" algn="l" rtl="0">
+              <a:spcBef>
+                <a:spcPts val="0"/>
+              </a:spcBef>
+              <a:spcAft>
+                <a:spcPts val="0"/>
+              </a:spcAft>
+              <a:buNone/>
+            </a:pPr>
+            <a:endParaRPr lang="en-US" dirty="0"/>
+          </a:p>
+        </p:txBody>
+      </p:sp>
+    </p:spTree>
+  </p:cSld>
+  <p:clrMapOvr>
+    <a:masterClrMapping/>
+  </p:clrMapOvr>
+</p:notes>
+</file>
+
+<file path=ppt/notesSlides/notesSlide22.xml><?xml version="1.0" encoding="utf-8"?>
+<p:notes xmlns:a="http://schemas.openxmlformats.org/drawingml/2006/main" xmlns:r="http://schemas.openxmlformats.org/officeDocument/2006/relationships" xmlns:p="http://schemas.openxmlformats.org/presentationml/2006/main" showMasterSp="0" showMasterPhAnim="0">
+  <p:cSld>
+    <p:spTree>
+      <p:nvGrpSpPr>
+        <p:cNvPr id="1" name="Shape 67"/>
+        <p:cNvGrpSpPr/>
+        <p:nvPr/>
+      </p:nvGrpSpPr>
+      <p:grpSpPr>
+        <a:xfrm>
+          <a:off x="0" y="0"/>
+          <a:ext cx="0" cy="0"/>
+          <a:chOff x="0" y="0"/>
+          <a:chExt cx="0" cy="0"/>
+        </a:xfrm>
+      </p:grpSpPr>
+      <p:sp>
+        <p:nvSpPr>
+          <p:cNvPr id="68" name="Google Shape;68;gc6f980f91_0_48:notes"/>
+          <p:cNvSpPr>
+            <a:spLocks noGrp="1" noRot="1" noChangeAspect="1"/>
+          </p:cNvSpPr>
+          <p:nvPr>
+            <p:ph type="sldImg" idx="2"/>
+          </p:nvPr>
+        </p:nvSpPr>
+        <p:spPr>
+          <a:xfrm>
+            <a:off x="381000" y="685800"/>
+            <a:ext cx="6096000" cy="3429000"/>
+          </a:xfrm>
+          <a:custGeom>
+            <a:avLst/>
+            <a:gdLst/>
+            <a:ahLst/>
+            <a:cxnLst/>
+            <a:rect l="l" t="t" r="r" b="b"/>
+            <a:pathLst>
+              <a:path w="120000" h="120000" extrusionOk="0">
+                <a:moveTo>
+                  <a:pt x="0" y="0"/>
+                </a:moveTo>
+                <a:lnTo>
+                  <a:pt x="120000" y="0"/>
+                </a:lnTo>
+                <a:lnTo>
+                  <a:pt x="120000" y="120000"/>
+                </a:lnTo>
+                <a:lnTo>
+                  <a:pt x="0" y="120000"/>
+                </a:lnTo>
+                <a:close/>
+              </a:path>
+            </a:pathLst>
+          </a:custGeom>
+        </p:spPr>
+      </p:sp>
+      <p:sp>
+        <p:nvSpPr>
+          <p:cNvPr id="69" name="Google Shape;69;gc6f980f91_0_48:notes"/>
+          <p:cNvSpPr txBox="1">
+            <a:spLocks noGrp="1"/>
+          </p:cNvSpPr>
+          <p:nvPr>
+            <p:ph type="body" idx="1"/>
+          </p:nvPr>
+        </p:nvSpPr>
+        <p:spPr>
+          <a:xfrm>
+            <a:off x="685800" y="4343400"/>
+            <a:ext cx="5486400" cy="4114800"/>
+          </a:xfrm>
+          <a:prstGeom prst="rect">
+            <a:avLst/>
+          </a:prstGeom>
+        </p:spPr>
+        <p:txBody>
+          <a:bodyPr spcFirstLastPara="1" wrap="square" lIns="91425" tIns="91425" rIns="91425" bIns="91425" anchor="t" anchorCtr="0">
+            <a:noAutofit/>
+          </a:bodyPr>
+          <a:lstStyle/>
+          <a:p>
+            <a:pPr marL="0" lvl="0" indent="0" algn="l" rtl="0">
+              <a:spcBef>
+                <a:spcPts val="0"/>
+              </a:spcBef>
+              <a:spcAft>
+                <a:spcPts val="0"/>
+              </a:spcAft>
+              <a:buNone/>
+            </a:pPr>
             <a:endParaRPr lang="en-US" dirty="0"/>
           </a:p>
         </p:txBody>
@@ -5731,7 +6081,7 @@
 </p:notes>
 </file>
 
-<file path=ppt/notesSlides/notesSlide21.xml><?xml version="1.0" encoding="utf-8"?>
+<file path=ppt/notesSlides/notesSlide23.xml><?xml version="1.0" encoding="utf-8"?>
 <p:notes xmlns:a="http://schemas.openxmlformats.org/drawingml/2006/main" xmlns:r="http://schemas.openxmlformats.org/officeDocument/2006/relationships" xmlns:p="http://schemas.openxmlformats.org/presentationml/2006/main" showMasterSp="0" showMasterPhAnim="0">
   <p:cSld>
     <p:spTree>
@@ -7181,7 +7531,7 @@
           <a:p>
             <a:fld id="{FB2FB183-A1E0-DF45-99B3-DDACA804963A}" type="datetimeFigureOut">
               <a:rPr lang="en-US" smtClean="0"/>
-              <a:t>12/2/21</a:t>
+              <a:t>12/3/21</a:t>
             </a:fld>
             <a:endParaRPr lang="en-US"/>
           </a:p>
@@ -7361,7 +7711,7 @@
           <a:p>
             <a:fld id="{FB2FB183-A1E0-DF45-99B3-DDACA804963A}" type="datetimeFigureOut">
               <a:rPr lang="en-US" smtClean="0"/>
-              <a:t>12/2/21</a:t>
+              <a:t>12/3/21</a:t>
             </a:fld>
             <a:endParaRPr lang="en-US"/>
           </a:p>
@@ -7551,7 +7901,7 @@
           <a:p>
             <a:fld id="{FB2FB183-A1E0-DF45-99B3-DDACA804963A}" type="datetimeFigureOut">
               <a:rPr lang="en-US" smtClean="0"/>
-              <a:t>12/2/21</a:t>
+              <a:t>12/3/21</a:t>
             </a:fld>
             <a:endParaRPr lang="en-US"/>
           </a:p>
@@ -7731,7 +8081,7 @@
           <a:p>
             <a:fld id="{FB2FB183-A1E0-DF45-99B3-DDACA804963A}" type="datetimeFigureOut">
               <a:rPr lang="en-US" smtClean="0"/>
-              <a:t>12/2/21</a:t>
+              <a:t>12/3/21</a:t>
             </a:fld>
             <a:endParaRPr lang="en-US"/>
           </a:p>
@@ -8009,7 +8359,7 @@
           <a:p>
             <a:fld id="{FB2FB183-A1E0-DF45-99B3-DDACA804963A}" type="datetimeFigureOut">
               <a:rPr lang="en-US" smtClean="0"/>
-              <a:t>12/2/21</a:t>
+              <a:t>12/3/21</a:t>
             </a:fld>
             <a:endParaRPr lang="en-US"/>
           </a:p>
@@ -8251,7 +8601,7 @@
           <a:p>
             <a:fld id="{FB2FB183-A1E0-DF45-99B3-DDACA804963A}" type="datetimeFigureOut">
               <a:rPr lang="en-US" smtClean="0"/>
-              <a:t>12/2/21</a:t>
+              <a:t>12/3/21</a:t>
             </a:fld>
             <a:endParaRPr lang="en-US"/>
           </a:p>
@@ -8620,7 +8970,7 @@
           <a:p>
             <a:fld id="{FB2FB183-A1E0-DF45-99B3-DDACA804963A}" type="datetimeFigureOut">
               <a:rPr lang="en-US" smtClean="0"/>
-              <a:t>12/2/21</a:t>
+              <a:t>12/3/21</a:t>
             </a:fld>
             <a:endParaRPr lang="en-US"/>
           </a:p>
@@ -8771,7 +9121,7 @@
           <a:p>
             <a:fld id="{FB2FB183-A1E0-DF45-99B3-DDACA804963A}" type="datetimeFigureOut">
               <a:rPr lang="en-US" smtClean="0"/>
-              <a:t>12/2/21</a:t>
+              <a:t>12/3/21</a:t>
             </a:fld>
             <a:endParaRPr lang="en-US"/>
           </a:p>
@@ -8876,7 +9226,7 @@
           <a:p>
             <a:fld id="{FB2FB183-A1E0-DF45-99B3-DDACA804963A}" type="datetimeFigureOut">
               <a:rPr lang="en-US" smtClean="0"/>
-              <a:t>12/2/21</a:t>
+              <a:t>12/3/21</a:t>
             </a:fld>
             <a:endParaRPr lang="en-US"/>
           </a:p>
@@ -9242,7 +9592,7 @@
           <a:p>
             <a:fld id="{FB2FB183-A1E0-DF45-99B3-DDACA804963A}" type="datetimeFigureOut">
               <a:rPr lang="en-US" smtClean="0"/>
-              <a:t>12/2/21</a:t>
+              <a:t>12/3/21</a:t>
             </a:fld>
             <a:endParaRPr lang="en-US"/>
           </a:p>
@@ -9609,7 +9959,7 @@
           <a:p>
             <a:fld id="{FB2FB183-A1E0-DF45-99B3-DDACA804963A}" type="datetimeFigureOut">
               <a:rPr lang="en-US" smtClean="0"/>
-              <a:t>12/2/21</a:t>
+              <a:t>12/3/21</a:t>
             </a:fld>
             <a:endParaRPr lang="en-US"/>
           </a:p>
@@ -9861,7 +10211,7 @@
           <a:p>
             <a:fld id="{FB2FB183-A1E0-DF45-99B3-DDACA804963A}" type="datetimeFigureOut">
               <a:rPr lang="en-US" smtClean="0"/>
-              <a:t>12/2/21</a:t>
+              <a:t>12/3/21</a:t>
             </a:fld>
             <a:endParaRPr lang="en-US"/>
           </a:p>
@@ -13105,7 +13455,7 @@
         </p:spPr>
         <p:txBody>
           <a:bodyPr spcFirstLastPara="1" vert="horz" lIns="91440" tIns="45720" rIns="91440" bIns="45720" rtlCol="0" anchorCtr="0">
-            <a:normAutofit fontScale="92500"/>
+            <a:normAutofit/>
           </a:bodyPr>
           <a:lstStyle/>
           <a:p>
@@ -13121,7 +13471,7 @@
               </a:spcAft>
             </a:pPr>
             <a:r>
-              <a:rPr lang="en-US" sz="1200" dirty="0"/>
+              <a:rPr lang="en-US" sz="1100"/>
               <a:t>Smaller Clusters were better (4)</a:t>
             </a:r>
           </a:p>
@@ -13138,7 +13488,7 @@
               </a:spcAft>
             </a:pPr>
             <a:r>
-              <a:rPr lang="en-US" sz="1200" dirty="0"/>
+              <a:rPr lang="en-US" sz="1100"/>
               <a:t>Heavy / Binge clusters with mortality rate produce silhouette scores ~0.51</a:t>
             </a:r>
           </a:p>
@@ -13155,14 +13505,14 @@
               </a:spcAft>
             </a:pPr>
             <a:r>
-              <a:rPr lang="en-US" sz="1200" b="1" i="1" dirty="0"/>
+              <a:rPr lang="en-US" sz="1100" b="1" i="1"/>
               <a:t>Including Labor Force and unemployment rate </a:t>
             </a:r>
             <a:r>
-              <a:rPr lang="en-US" sz="1200" i="1" dirty="0"/>
+              <a:rPr lang="en-US" sz="1100" i="1"/>
               <a:t>saw SIL score ~0.875 @ 4 clusters, ~0.73 @ 10 clusters</a:t>
             </a:r>
-            <a:endParaRPr lang="en-US" sz="1200" b="1" i="1" dirty="0"/>
+            <a:endParaRPr lang="en-US" sz="1100" b="1" i="1"/>
           </a:p>
           <a:p>
             <a:pPr marL="0" lvl="0" indent="-228600" defTabSz="914400">
@@ -13177,16 +13527,16 @@
               </a:spcAft>
             </a:pPr>
             <a:r>
-              <a:rPr lang="en-US" sz="1200" i="1" dirty="0"/>
+              <a:rPr lang="en-US" sz="1100" i="1"/>
               <a:t>Unfortunately not all states were present across all variables – even with missing data, it is still worthwhile to identify clusters for targeted intervention</a:t>
             </a:r>
-            <a:endParaRPr lang="en-US" sz="1200" b="1" i="1" dirty="0"/>
-          </a:p>
-        </p:txBody>
-      </p:sp>
-      <p:sp>
-        <p:nvSpPr>
-          <p:cNvPr id="104" name="Rectangle 103">
+            <a:endParaRPr lang="en-US" sz="1100" b="1" i="1"/>
+          </a:p>
+        </p:txBody>
+      </p:sp>
+      <p:sp>
+        <p:nvSpPr>
+          <p:cNvPr id="111" name="Rectangle 110">
             <a:extLst>
               <a:ext uri="{FF2B5EF4-FFF2-40B4-BE49-F238E27FC236}">
                 <a16:creationId xmlns:a16="http://schemas.microsoft.com/office/drawing/2014/main" id="{6515FC82-3453-4CBE-8895-4CCFF339529E}"/>
@@ -13250,7 +13600,7 @@
       </p:sp>
       <p:sp>
         <p:nvSpPr>
-          <p:cNvPr id="106" name="Rectangle 105">
+          <p:cNvPr id="113" name="Rectangle 112">
             <a:extLst>
               <a:ext uri="{FF2B5EF4-FFF2-40B4-BE49-F238E27FC236}">
                 <a16:creationId xmlns:a16="http://schemas.microsoft.com/office/drawing/2014/main" id="{C5FD847B-65C0-4027-8DFC-70CB424514F8}"/>
@@ -13313,10 +13663,10 @@
       </p:sp>
       <p:pic>
         <p:nvPicPr>
-          <p:cNvPr id="4" name="Picture 3" descr="A picture containing text&#10;&#10;Description automatically generated">
+          <p:cNvPr id="3" name="Picture 2" descr="Map&#10;&#10;Description automatically generated">
             <a:extLst>
               <a:ext uri="{FF2B5EF4-FFF2-40B4-BE49-F238E27FC236}">
-                <a16:creationId xmlns:a16="http://schemas.microsoft.com/office/drawing/2014/main" id="{770A7B90-35E5-884F-9A72-CF6D1973EFA1}"/>
+                <a16:creationId xmlns:a16="http://schemas.microsoft.com/office/drawing/2014/main" id="{9048846F-661D-AD47-B21E-E1C61B5DB1A4}"/>
               </a:ext>
             </a:extLst>
           </p:cNvPr>
@@ -13333,8 +13683,8 @@
         </p:blipFill>
         <p:spPr>
           <a:xfrm>
-            <a:off x="3617524" y="1126936"/>
-            <a:ext cx="4670298" cy="2895584"/>
+            <a:off x="3617524" y="1156126"/>
+            <a:ext cx="4670298" cy="2837204"/>
           </a:xfrm>
           <a:prstGeom prst="rect">
             <a:avLst/>
@@ -13463,7 +13813,7 @@
       </p:grpSpPr>
       <p:sp>
         <p:nvSpPr>
-          <p:cNvPr id="111" name="Rectangle 110">
+          <p:cNvPr id="126" name="Rectangle 125">
             <a:extLst>
               <a:ext uri="{FF2B5EF4-FFF2-40B4-BE49-F238E27FC236}">
                 <a16:creationId xmlns:a16="http://schemas.microsoft.com/office/drawing/2014/main" id="{6EDED847-34F1-4353-AA83-1525E9E40671}"/>
@@ -13555,22 +13905,18 @@
               </a:spcAft>
             </a:pPr>
             <a:r>
-              <a:rPr lang="en-US" sz="2800" spc="200" dirty="0" err="1"/>
-              <a:t>Kmeans</a:t>
-            </a:r>
-            <a:r>
-              <a:rPr lang="en-US" sz="2800" spc="200" dirty="0"/>
-              <a:t> – 10 Clusters</a:t>
+              <a:rPr lang="en-US" sz="1500" spc="200"/>
+              <a:t>Kmeans Heavy Alcohol USe &amp; unemployment</a:t>
             </a:r>
           </a:p>
         </p:txBody>
       </p:sp>
       <p:pic>
         <p:nvPicPr>
-          <p:cNvPr id="3" name="Picture 2" descr="A picture containing text&#10;&#10;Description automatically generated">
+          <p:cNvPr id="8" name="Picture 7" descr="Map&#10;&#10;Description automatically generated">
             <a:extLst>
               <a:ext uri="{FF2B5EF4-FFF2-40B4-BE49-F238E27FC236}">
-                <a16:creationId xmlns:a16="http://schemas.microsoft.com/office/drawing/2014/main" id="{513A1A8D-7A19-0741-90A2-201A37FCEC71}"/>
+                <a16:creationId xmlns:a16="http://schemas.microsoft.com/office/drawing/2014/main" id="{7045968C-179E-1745-8230-1C17DD693F02}"/>
               </a:ext>
             </a:extLst>
           </p:cNvPr>
@@ -13581,13 +13927,13 @@
         </p:nvPicPr>
         <p:blipFill rotWithShape="1">
           <a:blip r:embed="rId3"/>
-          <a:srcRect l="2337" r="1054" b="4863"/>
+          <a:srcRect l="1906" r="1659" b="7532"/>
           <a:stretch/>
         </p:blipFill>
         <p:spPr>
           <a:xfrm>
-            <a:off x="1805699" y="224741"/>
-            <a:ext cx="5875261" cy="3471361"/>
+            <a:off x="1952003" y="200409"/>
+            <a:ext cx="5502187" cy="3336989"/>
           </a:xfrm>
           <a:prstGeom prst="rect">
             <a:avLst/>
@@ -13677,7 +14023,7 @@
     </p:spTree>
     <p:extLst>
       <p:ext uri="{BB962C8B-B14F-4D97-AF65-F5344CB8AC3E}">
-        <p14:creationId xmlns:p14="http://schemas.microsoft.com/office/powerpoint/2010/main" val="2186691466"/>
+        <p14:creationId xmlns:p14="http://schemas.microsoft.com/office/powerpoint/2010/main" val="3754806094"/>
       </p:ext>
     </p:extLst>
   </p:cSld>
@@ -13693,9 +14039,8 @@
     <p:bg>
       <p:bgPr>
         <a:solidFill>
-          <a:schemeClr val="bg2">
-            <a:tint val="95000"/>
-            <a:satMod val="170000"/>
+          <a:schemeClr val="bg1">
+            <a:lumMod val="95000"/>
           </a:schemeClr>
         </a:solidFill>
         <a:effectLst/>
@@ -13717,10 +14062,10 @@
       </p:grpSpPr>
       <p:sp>
         <p:nvSpPr>
-          <p:cNvPr id="86" name="Rectangle 85">
+          <p:cNvPr id="116" name="Rectangle 115">
             <a:extLst>
               <a:ext uri="{FF2B5EF4-FFF2-40B4-BE49-F238E27FC236}">
-                <a16:creationId xmlns:a16="http://schemas.microsoft.com/office/drawing/2014/main" id="{D2D2ED89-5AE9-4E9E-B74C-07803A862DB0}"/>
+                <a16:creationId xmlns:a16="http://schemas.microsoft.com/office/drawing/2014/main" id="{6EDED847-34F1-4353-AA83-1525E9E40671}"/>
               </a:ext>
               <a:ext uri="{C183D7F6-B498-43B3-948B-1728B52AA6E4}">
                 <adec:decorative xmlns:adec="http://schemas.microsoft.com/office/drawing/2017/decorative" val="1"/>
@@ -13740,14 +14085,14 @@
         </p:nvSpPr>
         <p:spPr>
           <a:xfrm>
-            <a:off x="2047461" y="0"/>
-            <a:ext cx="5049078" cy="5143500"/>
+            <a:off x="0" y="0"/>
+            <a:ext cx="9144000" cy="4107580"/>
           </a:xfrm>
           <a:prstGeom prst="rect">
             <a:avLst/>
           </a:prstGeom>
           <a:solidFill>
-            <a:schemeClr val="bg2"/>
+            <a:srgbClr val="FFFFFF"/>
           </a:solidFill>
           <a:ln>
             <a:noFill/>
@@ -13790,24 +14135,16 @@
         </p:nvSpPr>
         <p:spPr>
           <a:xfrm>
-            <a:off x="1320799" y="723519"/>
-            <a:ext cx="6502401" cy="891540"/>
+            <a:off x="1805699" y="3696102"/>
+            <a:ext cx="5797296" cy="850801"/>
           </a:xfrm>
           <a:prstGeom prst="rect">
             <a:avLst/>
           </a:prstGeom>
-          <a:solidFill>
-            <a:srgbClr val="FFFFFF"/>
-          </a:solidFill>
-          <a:ln>
-            <a:solidFill>
-              <a:srgbClr val="404040"/>
-            </a:solidFill>
-          </a:ln>
         </p:spPr>
         <p:txBody>
           <a:bodyPr spcFirstLastPara="1" vert="horz" lIns="182880" tIns="182880" rIns="182880" bIns="182880" rtlCol="0" anchor="ctr" anchorCtr="0">
-            <a:normAutofit/>
+            <a:normAutofit fontScale="90000"/>
           </a:bodyPr>
           <a:lstStyle/>
           <a:p>
@@ -13817,133 +14154,54 @@
               </a:spcAft>
             </a:pPr>
             <a:r>
-              <a:rPr lang="en-US" sz="2800" kern="1200" cap="all" spc="200" baseline="0">
-                <a:solidFill>
-                  <a:srgbClr val="404040"/>
-                </a:solidFill>
-                <a:latin typeface="+mj-lt"/>
-                <a:ea typeface="+mj-ea"/>
-                <a:cs typeface="+mj-cs"/>
-              </a:rPr>
-              <a:t>Conclusions</a:t>
-            </a:r>
-          </a:p>
-        </p:txBody>
-      </p:sp>
-      <p:sp>
-        <p:nvSpPr>
-          <p:cNvPr id="72" name="Google Shape;72;p15"/>
-          <p:cNvSpPr txBox="1">
-            <a:spLocks noGrp="1"/>
-          </p:cNvSpPr>
-          <p:nvPr>
-            <p:ph type="body" idx="4294967295"/>
-          </p:nvPr>
-        </p:nvSpPr>
-        <p:spPr>
-          <a:xfrm>
-            <a:off x="2429122" y="1839544"/>
-            <a:ext cx="4285753" cy="3112846"/>
+              <a:rPr lang="en-US" sz="2800" spc="200" dirty="0" err="1"/>
+              <a:t>Kmeans</a:t>
+            </a:r>
+            <a:r>
+              <a:rPr lang="en-US" sz="2800" spc="200" dirty="0"/>
+              <a:t> Binge </a:t>
+            </a:r>
+            <a:r>
+              <a:rPr lang="en-US" sz="2800" spc="200" dirty="0" err="1"/>
+              <a:t>USe</a:t>
+            </a:r>
+            <a:r>
+              <a:rPr lang="en-US" sz="2800" spc="200" dirty="0"/>
+              <a:t> &amp; unemployment</a:t>
+            </a:r>
+          </a:p>
+        </p:txBody>
+      </p:sp>
+      <p:pic>
+        <p:nvPicPr>
+          <p:cNvPr id="4" name="Picture 3" descr="A picture containing text&#10;&#10;Description automatically generated">
+            <a:extLst>
+              <a:ext uri="{FF2B5EF4-FFF2-40B4-BE49-F238E27FC236}">
+                <a16:creationId xmlns:a16="http://schemas.microsoft.com/office/drawing/2014/main" id="{4D66BDA5-0604-5A49-8735-D0589A880A9F}"/>
+              </a:ext>
+            </a:extLst>
+          </p:cNvPr>
+          <p:cNvPicPr>
+            <a:picLocks noChangeAspect="1"/>
+          </p:cNvPicPr>
+          <p:nvPr/>
+        </p:nvPicPr>
+        <p:blipFill>
+          <a:blip r:embed="rId3"/>
+          <a:stretch>
+            <a:fillRect/>
+          </a:stretch>
+        </p:blipFill>
+        <p:spPr>
+          <a:xfrm>
+            <a:off x="2420870" y="720088"/>
+            <a:ext cx="4302260" cy="2667401"/>
           </a:xfrm>
           <a:prstGeom prst="rect">
             <a:avLst/>
           </a:prstGeom>
         </p:spPr>
-        <p:txBody>
-          <a:bodyPr spcFirstLastPara="1" vert="horz" lIns="91440" tIns="45720" rIns="91440" bIns="45720" rtlCol="0" anchorCtr="0">
-            <a:normAutofit lnSpcReduction="10000"/>
-          </a:bodyPr>
-          <a:lstStyle/>
-          <a:p>
-            <a:pPr marL="0" lvl="0" indent="-228600" defTabSz="914400">
-              <a:spcBef>
-                <a:spcPts val="1000"/>
-              </a:spcBef>
-              <a:spcAft>
-                <a:spcPts val="0"/>
-              </a:spcAft>
-            </a:pPr>
-            <a:r>
-              <a:rPr lang="en-US" b="1" dirty="0"/>
-              <a:t>Multivariate Regression Models Outperform Single Variable Regression</a:t>
-            </a:r>
-          </a:p>
-          <a:p>
-            <a:pPr marL="0" lvl="0" indent="-228600" defTabSz="914400">
-              <a:spcBef>
-                <a:spcPts val="1000"/>
-              </a:spcBef>
-              <a:spcAft>
-                <a:spcPts val="0"/>
-              </a:spcAft>
-            </a:pPr>
-            <a:r>
-              <a:rPr lang="en-US" dirty="0"/>
-              <a:t>If Univariate Models represent our Baseline</a:t>
-            </a:r>
-          </a:p>
-          <a:p>
-            <a:pPr marL="171450" lvl="1" indent="-228600" defTabSz="914400">
-              <a:spcBef>
-                <a:spcPts val="1000"/>
-              </a:spcBef>
-            </a:pPr>
-            <a:r>
-              <a:rPr lang="en-US" b="1" dirty="0"/>
-              <a:t>K-Means Creates Meaningful Pockets of Similarly Afflicted Counties</a:t>
-            </a:r>
-          </a:p>
-          <a:p>
-            <a:pPr marL="514350" lvl="3" indent="-228600" defTabSz="914400">
-              <a:spcBef>
-                <a:spcPts val="1000"/>
-              </a:spcBef>
-            </a:pPr>
-            <a:r>
-              <a:rPr lang="en-US" i="1" dirty="0"/>
-              <a:t>Those interested in optimizing and more efficiently using public health research dollars can use these clusters to engage in regionally targeted intervention that addresses two mortality causes at once</a:t>
-            </a:r>
-          </a:p>
-          <a:p>
-            <a:pPr marL="171450" lvl="1" indent="-228600" defTabSz="914400">
-              <a:spcBef>
-                <a:spcPts val="1000"/>
-              </a:spcBef>
-            </a:pPr>
-            <a:r>
-              <a:rPr lang="en-US" b="1" i="1" dirty="0"/>
-              <a:t>In the Future</a:t>
-            </a:r>
-          </a:p>
-          <a:p>
-            <a:pPr marL="342900" lvl="2" indent="-228600" defTabSz="914400">
-              <a:spcBef>
-                <a:spcPts val="1000"/>
-              </a:spcBef>
-            </a:pPr>
-            <a:r>
-              <a:rPr lang="en-US" i="1" dirty="0"/>
-              <a:t>Get more complete data, built out </a:t>
-            </a:r>
-            <a:r>
-              <a:rPr lang="en-US" i="1" dirty="0" err="1"/>
-              <a:t>streamlit</a:t>
-            </a:r>
-            <a:r>
-              <a:rPr lang="en-US" i="1" dirty="0"/>
-              <a:t> app, , examine relationships between sunlight and self-harm mortality</a:t>
-            </a:r>
-          </a:p>
-          <a:p>
-            <a:pPr marL="514350" lvl="3" indent="-228600" defTabSz="914400">
-              <a:spcBef>
-                <a:spcPts val="1000"/>
-              </a:spcBef>
-            </a:pPr>
-            <a:endParaRPr lang="en-US" i="1" dirty="0"/>
-          </a:p>
-        </p:txBody>
-      </p:sp>
+      </p:pic>
       <p:sp>
         <p:nvSpPr>
           <p:cNvPr id="73" name="Google Shape;73;p15"/>
@@ -14025,9 +14283,14 @@
         </p:txBody>
       </p:sp>
     </p:spTree>
+    <p:extLst>
+      <p:ext uri="{BB962C8B-B14F-4D97-AF65-F5344CB8AC3E}">
+        <p14:creationId xmlns:p14="http://schemas.microsoft.com/office/powerpoint/2010/main" val="1116433720"/>
+      </p:ext>
+    </p:extLst>
   </p:cSld>
   <p:clrMapOvr>
-    <a:overrideClrMapping bg1="dk1" tx1="lt1" bg2="dk2" tx2="lt2" accent1="accent1" accent2="accent2" accent3="accent3" accent4="accent4" accent5="accent5" accent6="accent6" hlink="hlink" folHlink="folHlink"/>
+    <a:masterClrMapping/>
   </p:clrMapOvr>
 </p:sld>
 </file>
@@ -14533,6 +14796,604 @@
     <p:bg>
       <p:bgPr>
         <a:solidFill>
+          <a:schemeClr val="bg1">
+            <a:lumMod val="95000"/>
+          </a:schemeClr>
+        </a:solidFill>
+        <a:effectLst/>
+      </p:bgPr>
+    </p:bg>
+    <p:spTree>
+      <p:nvGrpSpPr>
+        <p:cNvPr id="1" name="Shape 70"/>
+        <p:cNvGrpSpPr/>
+        <p:nvPr/>
+      </p:nvGrpSpPr>
+      <p:grpSpPr>
+        <a:xfrm>
+          <a:off x="0" y="0"/>
+          <a:ext cx="0" cy="0"/>
+          <a:chOff x="0" y="0"/>
+          <a:chExt cx="0" cy="0"/>
+        </a:xfrm>
+      </p:grpSpPr>
+      <p:sp>
+        <p:nvSpPr>
+          <p:cNvPr id="111" name="Rectangle 110">
+            <a:extLst>
+              <a:ext uri="{FF2B5EF4-FFF2-40B4-BE49-F238E27FC236}">
+                <a16:creationId xmlns:a16="http://schemas.microsoft.com/office/drawing/2014/main" id="{6EDED847-34F1-4353-AA83-1525E9E40671}"/>
+              </a:ext>
+              <a:ext uri="{C183D7F6-B498-43B3-948B-1728B52AA6E4}">
+                <adec:decorative xmlns:adec="http://schemas.microsoft.com/office/drawing/2017/decorative" val="1"/>
+              </a:ext>
+            </a:extLst>
+          </p:cNvPr>
+          <p:cNvSpPr>
+            <a:spLocks noGrp="1" noRot="1" noChangeAspect="1" noMove="1" noResize="1" noEditPoints="1" noAdjustHandles="1" noChangeArrowheads="1" noChangeShapeType="1" noTextEdit="1"/>
+          </p:cNvSpPr>
+          <p:nvPr>
+            <p:extLst>
+              <p:ext uri="{386F3935-93C4-4BCD-93E2-E3B085C9AB24}">
+                <p16:designElem xmlns:p16="http://schemas.microsoft.com/office/powerpoint/2015/main" val="1"/>
+              </p:ext>
+            </p:extLst>
+          </p:nvPr>
+        </p:nvSpPr>
+        <p:spPr>
+          <a:xfrm>
+            <a:off x="0" y="0"/>
+            <a:ext cx="9144000" cy="4107580"/>
+          </a:xfrm>
+          <a:prstGeom prst="rect">
+            <a:avLst/>
+          </a:prstGeom>
+          <a:solidFill>
+            <a:srgbClr val="FFFFFF"/>
+          </a:solidFill>
+          <a:ln>
+            <a:noFill/>
+          </a:ln>
+        </p:spPr>
+        <p:style>
+          <a:lnRef idx="2">
+            <a:schemeClr val="accent1">
+              <a:shade val="50000"/>
+            </a:schemeClr>
+          </a:lnRef>
+          <a:fillRef idx="1">
+            <a:schemeClr val="accent1"/>
+          </a:fillRef>
+          <a:effectRef idx="0">
+            <a:schemeClr val="accent1"/>
+          </a:effectRef>
+          <a:fontRef idx="minor">
+            <a:schemeClr val="lt1"/>
+          </a:fontRef>
+        </p:style>
+        <p:txBody>
+          <a:bodyPr rtlCol="0" anchor="ctr"/>
+          <a:lstStyle/>
+          <a:p>
+            <a:pPr algn="ctr"/>
+            <a:endParaRPr lang="en-US"/>
+          </a:p>
+        </p:txBody>
+      </p:sp>
+      <p:sp>
+        <p:nvSpPr>
+          <p:cNvPr id="71" name="Google Shape;71;p15"/>
+          <p:cNvSpPr txBox="1">
+            <a:spLocks noGrp="1"/>
+          </p:cNvSpPr>
+          <p:nvPr>
+            <p:ph type="title" idx="4294967295"/>
+          </p:nvPr>
+        </p:nvSpPr>
+        <p:spPr>
+          <a:xfrm>
+            <a:off x="1805699" y="3696102"/>
+            <a:ext cx="5797296" cy="850801"/>
+          </a:xfrm>
+          <a:prstGeom prst="rect">
+            <a:avLst/>
+          </a:prstGeom>
+        </p:spPr>
+        <p:txBody>
+          <a:bodyPr spcFirstLastPara="1" vert="horz" lIns="182880" tIns="182880" rIns="182880" bIns="182880" rtlCol="0" anchor="ctr" anchorCtr="0">
+            <a:normAutofit fontScale="90000"/>
+          </a:bodyPr>
+          <a:lstStyle/>
+          <a:p>
+            <a:pPr marL="0" lvl="0" indent="0" defTabSz="914400">
+              <a:spcAft>
+                <a:spcPts val="0"/>
+              </a:spcAft>
+            </a:pPr>
+            <a:r>
+              <a:rPr lang="en-US" sz="2800" spc="200" dirty="0" err="1"/>
+              <a:t>Kmeans</a:t>
+            </a:r>
+            <a:r>
+              <a:rPr lang="en-US" sz="2800" spc="200" dirty="0"/>
+              <a:t> Binge Use &amp; unemployment</a:t>
+            </a:r>
+          </a:p>
+        </p:txBody>
+      </p:sp>
+      <p:pic>
+        <p:nvPicPr>
+          <p:cNvPr id="3" name="Picture 2" descr="A picture containing text&#10;&#10;Description automatically generated">
+            <a:extLst>
+              <a:ext uri="{FF2B5EF4-FFF2-40B4-BE49-F238E27FC236}">
+                <a16:creationId xmlns:a16="http://schemas.microsoft.com/office/drawing/2014/main" id="{513A1A8D-7A19-0741-90A2-201A37FCEC71}"/>
+              </a:ext>
+            </a:extLst>
+          </p:cNvPr>
+          <p:cNvPicPr>
+            <a:picLocks noChangeAspect="1"/>
+          </p:cNvPicPr>
+          <p:nvPr/>
+        </p:nvPicPr>
+        <p:blipFill rotWithShape="1">
+          <a:blip r:embed="rId3"/>
+          <a:srcRect l="2337" r="1054" b="4863"/>
+          <a:stretch/>
+        </p:blipFill>
+        <p:spPr>
+          <a:xfrm>
+            <a:off x="1805699" y="224741"/>
+            <a:ext cx="5875261" cy="3471361"/>
+          </a:xfrm>
+          <a:prstGeom prst="rect">
+            <a:avLst/>
+          </a:prstGeom>
+        </p:spPr>
+      </p:pic>
+      <p:sp>
+        <p:nvSpPr>
+          <p:cNvPr id="73" name="Google Shape;73;p15"/>
+          <p:cNvSpPr/>
+          <p:nvPr/>
+        </p:nvSpPr>
+        <p:spPr>
+          <a:xfrm>
+            <a:off x="8685573" y="254209"/>
+            <a:ext cx="219000" cy="219000"/>
+          </a:xfrm>
+          <a:prstGeom prst="rect">
+            <a:avLst/>
+          </a:prstGeom>
+          <a:solidFill>
+            <a:schemeClr val="dk1"/>
+          </a:solidFill>
+          <a:ln>
+            <a:noFill/>
+          </a:ln>
+        </p:spPr>
+        <p:txBody>
+          <a:bodyPr spcFirstLastPara="1" wrap="square" lIns="91425" tIns="91425" rIns="91425" bIns="91425" anchor="ctr" anchorCtr="0">
+            <a:noAutofit/>
+          </a:bodyPr>
+          <a:lstStyle/>
+          <a:p>
+            <a:pPr marL="0" lvl="0" indent="0" algn="l" rtl="0">
+              <a:spcBef>
+                <a:spcPts val="0"/>
+              </a:spcBef>
+              <a:spcAft>
+                <a:spcPts val="0"/>
+              </a:spcAft>
+              <a:buNone/>
+            </a:pPr>
+            <a:endParaRPr/>
+          </a:p>
+        </p:txBody>
+      </p:sp>
+      <p:sp>
+        <p:nvSpPr>
+          <p:cNvPr id="74" name="Google Shape;74;p15"/>
+          <p:cNvSpPr/>
+          <p:nvPr/>
+        </p:nvSpPr>
+        <p:spPr>
+          <a:xfrm>
+            <a:off x="8685573" y="602134"/>
+            <a:ext cx="219000" cy="219000"/>
+          </a:xfrm>
+          <a:prstGeom prst="rect">
+            <a:avLst/>
+          </a:prstGeom>
+          <a:solidFill>
+            <a:schemeClr val="accent3"/>
+          </a:solidFill>
+          <a:ln>
+            <a:noFill/>
+          </a:ln>
+        </p:spPr>
+        <p:txBody>
+          <a:bodyPr spcFirstLastPara="1" wrap="square" lIns="91425" tIns="91425" rIns="91425" bIns="91425" anchor="ctr" anchorCtr="0">
+            <a:noAutofit/>
+          </a:bodyPr>
+          <a:lstStyle/>
+          <a:p>
+            <a:pPr marL="0" lvl="0" indent="0" algn="l" rtl="0">
+              <a:spcBef>
+                <a:spcPts val="0"/>
+              </a:spcBef>
+              <a:spcAft>
+                <a:spcPts val="0"/>
+              </a:spcAft>
+              <a:buNone/>
+            </a:pPr>
+            <a:endParaRPr/>
+          </a:p>
+        </p:txBody>
+      </p:sp>
+    </p:spTree>
+    <p:extLst>
+      <p:ext uri="{BB962C8B-B14F-4D97-AF65-F5344CB8AC3E}">
+        <p14:creationId xmlns:p14="http://schemas.microsoft.com/office/powerpoint/2010/main" val="2186691466"/>
+      </p:ext>
+    </p:extLst>
+  </p:cSld>
+  <p:clrMapOvr>
+    <a:masterClrMapping/>
+  </p:clrMapOvr>
+</p:sld>
+</file>
+
+<file path=ppt/slides/slide21.xml><?xml version="1.0" encoding="utf-8"?>
+<p:sld xmlns:a="http://schemas.openxmlformats.org/drawingml/2006/main" xmlns:r="http://schemas.openxmlformats.org/officeDocument/2006/relationships" xmlns:p="http://schemas.openxmlformats.org/presentationml/2006/main">
+  <p:cSld>
+    <p:bg>
+      <p:bgPr>
+        <a:solidFill>
+          <a:schemeClr val="bg2">
+            <a:tint val="95000"/>
+            <a:satMod val="170000"/>
+          </a:schemeClr>
+        </a:solidFill>
+        <a:effectLst/>
+      </p:bgPr>
+    </p:bg>
+    <p:spTree>
+      <p:nvGrpSpPr>
+        <p:cNvPr id="1" name="Shape 70"/>
+        <p:cNvGrpSpPr/>
+        <p:nvPr/>
+      </p:nvGrpSpPr>
+      <p:grpSpPr>
+        <a:xfrm>
+          <a:off x="0" y="0"/>
+          <a:ext cx="0" cy="0"/>
+          <a:chOff x="0" y="0"/>
+          <a:chExt cx="0" cy="0"/>
+        </a:xfrm>
+      </p:grpSpPr>
+      <p:sp>
+        <p:nvSpPr>
+          <p:cNvPr id="86" name="Rectangle 85">
+            <a:extLst>
+              <a:ext uri="{FF2B5EF4-FFF2-40B4-BE49-F238E27FC236}">
+                <a16:creationId xmlns:a16="http://schemas.microsoft.com/office/drawing/2014/main" id="{D2D2ED89-5AE9-4E9E-B74C-07803A862DB0}"/>
+              </a:ext>
+              <a:ext uri="{C183D7F6-B498-43B3-948B-1728B52AA6E4}">
+                <adec:decorative xmlns:adec="http://schemas.microsoft.com/office/drawing/2017/decorative" val="1"/>
+              </a:ext>
+            </a:extLst>
+          </p:cNvPr>
+          <p:cNvSpPr>
+            <a:spLocks noGrp="1" noRot="1" noChangeAspect="1" noMove="1" noResize="1" noEditPoints="1" noAdjustHandles="1" noChangeArrowheads="1" noChangeShapeType="1" noTextEdit="1"/>
+          </p:cNvSpPr>
+          <p:nvPr>
+            <p:extLst>
+              <p:ext uri="{386F3935-93C4-4BCD-93E2-E3B085C9AB24}">
+                <p16:designElem xmlns:p16="http://schemas.microsoft.com/office/powerpoint/2015/main" val="1"/>
+              </p:ext>
+            </p:extLst>
+          </p:nvPr>
+        </p:nvSpPr>
+        <p:spPr>
+          <a:xfrm>
+            <a:off x="2047461" y="0"/>
+            <a:ext cx="5049078" cy="5143500"/>
+          </a:xfrm>
+          <a:prstGeom prst="rect">
+            <a:avLst/>
+          </a:prstGeom>
+          <a:solidFill>
+            <a:schemeClr val="bg2"/>
+          </a:solidFill>
+          <a:ln>
+            <a:noFill/>
+          </a:ln>
+        </p:spPr>
+        <p:style>
+          <a:lnRef idx="2">
+            <a:schemeClr val="accent1">
+              <a:shade val="50000"/>
+            </a:schemeClr>
+          </a:lnRef>
+          <a:fillRef idx="1">
+            <a:schemeClr val="accent1"/>
+          </a:fillRef>
+          <a:effectRef idx="0">
+            <a:schemeClr val="accent1"/>
+          </a:effectRef>
+          <a:fontRef idx="minor">
+            <a:schemeClr val="lt1"/>
+          </a:fontRef>
+        </p:style>
+        <p:txBody>
+          <a:bodyPr rtlCol="0" anchor="ctr"/>
+          <a:lstStyle/>
+          <a:p>
+            <a:pPr algn="ctr"/>
+            <a:endParaRPr lang="en-US"/>
+          </a:p>
+        </p:txBody>
+      </p:sp>
+      <p:sp>
+        <p:nvSpPr>
+          <p:cNvPr id="71" name="Google Shape;71;p15"/>
+          <p:cNvSpPr txBox="1">
+            <a:spLocks noGrp="1"/>
+          </p:cNvSpPr>
+          <p:nvPr>
+            <p:ph type="title" idx="4294967295"/>
+          </p:nvPr>
+        </p:nvSpPr>
+        <p:spPr>
+          <a:xfrm>
+            <a:off x="1320799" y="723519"/>
+            <a:ext cx="6502401" cy="891540"/>
+          </a:xfrm>
+          <a:prstGeom prst="rect">
+            <a:avLst/>
+          </a:prstGeom>
+          <a:solidFill>
+            <a:srgbClr val="FFFFFF"/>
+          </a:solidFill>
+          <a:ln>
+            <a:solidFill>
+              <a:srgbClr val="404040"/>
+            </a:solidFill>
+          </a:ln>
+        </p:spPr>
+        <p:txBody>
+          <a:bodyPr spcFirstLastPara="1" vert="horz" lIns="182880" tIns="182880" rIns="182880" bIns="182880" rtlCol="0" anchor="ctr" anchorCtr="0">
+            <a:normAutofit/>
+          </a:bodyPr>
+          <a:lstStyle/>
+          <a:p>
+            <a:pPr marL="0" lvl="0" indent="0" defTabSz="914400">
+              <a:spcAft>
+                <a:spcPts val="0"/>
+              </a:spcAft>
+            </a:pPr>
+            <a:r>
+              <a:rPr lang="en-US" sz="2800" kern="1200" cap="all" spc="200" baseline="0">
+                <a:solidFill>
+                  <a:srgbClr val="404040"/>
+                </a:solidFill>
+                <a:latin typeface="+mj-lt"/>
+                <a:ea typeface="+mj-ea"/>
+                <a:cs typeface="+mj-cs"/>
+              </a:rPr>
+              <a:t>Conclusions</a:t>
+            </a:r>
+          </a:p>
+        </p:txBody>
+      </p:sp>
+      <p:sp>
+        <p:nvSpPr>
+          <p:cNvPr id="72" name="Google Shape;72;p15"/>
+          <p:cNvSpPr txBox="1">
+            <a:spLocks noGrp="1"/>
+          </p:cNvSpPr>
+          <p:nvPr>
+            <p:ph type="body" idx="4294967295"/>
+          </p:nvPr>
+        </p:nvSpPr>
+        <p:spPr>
+          <a:xfrm>
+            <a:off x="2429122" y="1839544"/>
+            <a:ext cx="4285753" cy="3112846"/>
+          </a:xfrm>
+          <a:prstGeom prst="rect">
+            <a:avLst/>
+          </a:prstGeom>
+        </p:spPr>
+        <p:txBody>
+          <a:bodyPr spcFirstLastPara="1" vert="horz" lIns="91440" tIns="45720" rIns="91440" bIns="45720" rtlCol="0" anchorCtr="0">
+            <a:normAutofit lnSpcReduction="10000"/>
+          </a:bodyPr>
+          <a:lstStyle/>
+          <a:p>
+            <a:pPr marL="0" lvl="0" indent="-228600" defTabSz="914400">
+              <a:spcBef>
+                <a:spcPts val="1000"/>
+              </a:spcBef>
+              <a:spcAft>
+                <a:spcPts val="0"/>
+              </a:spcAft>
+            </a:pPr>
+            <a:r>
+              <a:rPr lang="en-US" b="1" dirty="0"/>
+              <a:t>Multivariate Regression Models Outperform Single Variable Regression</a:t>
+            </a:r>
+          </a:p>
+          <a:p>
+            <a:pPr marL="0" lvl="0" indent="-228600" defTabSz="914400">
+              <a:spcBef>
+                <a:spcPts val="1000"/>
+              </a:spcBef>
+              <a:spcAft>
+                <a:spcPts val="0"/>
+              </a:spcAft>
+            </a:pPr>
+            <a:r>
+              <a:rPr lang="en-US" dirty="0"/>
+              <a:t>If Univariate Models represent our Baseline</a:t>
+            </a:r>
+          </a:p>
+          <a:p>
+            <a:pPr marL="171450" lvl="1" indent="-228600" defTabSz="914400">
+              <a:spcBef>
+                <a:spcPts val="1000"/>
+              </a:spcBef>
+            </a:pPr>
+            <a:r>
+              <a:rPr lang="en-US" b="1" dirty="0"/>
+              <a:t>K-Means Creates Meaningful Pockets of Similarly Afflicted Counties</a:t>
+            </a:r>
+          </a:p>
+          <a:p>
+            <a:pPr marL="514350" lvl="3" indent="-228600" defTabSz="914400">
+              <a:spcBef>
+                <a:spcPts val="1000"/>
+              </a:spcBef>
+            </a:pPr>
+            <a:r>
+              <a:rPr lang="en-US" i="1" dirty="0"/>
+              <a:t>Those interested in optimizing and more efficiently using public health research dollars can use these clusters to engage in regionally targeted intervention that addresses two mortality causes at once</a:t>
+            </a:r>
+          </a:p>
+          <a:p>
+            <a:pPr marL="171450" lvl="1" indent="-228600" defTabSz="914400">
+              <a:spcBef>
+                <a:spcPts val="1000"/>
+              </a:spcBef>
+            </a:pPr>
+            <a:r>
+              <a:rPr lang="en-US" b="1" i="1" dirty="0"/>
+              <a:t>In the Future</a:t>
+            </a:r>
+          </a:p>
+          <a:p>
+            <a:pPr marL="342900" lvl="2" indent="-228600" defTabSz="914400">
+              <a:spcBef>
+                <a:spcPts val="1000"/>
+              </a:spcBef>
+            </a:pPr>
+            <a:r>
+              <a:rPr lang="en-US" i="1" dirty="0"/>
+              <a:t>Get more complete data, built out </a:t>
+            </a:r>
+            <a:r>
+              <a:rPr lang="en-US" i="1" dirty="0" err="1"/>
+              <a:t>streamlit</a:t>
+            </a:r>
+            <a:r>
+              <a:rPr lang="en-US" i="1" dirty="0"/>
+              <a:t> app, , examine relationships between sunlight and self-harm mortality</a:t>
+            </a:r>
+          </a:p>
+          <a:p>
+            <a:pPr marL="514350" lvl="3" indent="-228600" defTabSz="914400">
+              <a:spcBef>
+                <a:spcPts val="1000"/>
+              </a:spcBef>
+            </a:pPr>
+            <a:endParaRPr lang="en-US" i="1" dirty="0"/>
+          </a:p>
+        </p:txBody>
+      </p:sp>
+      <p:sp>
+        <p:nvSpPr>
+          <p:cNvPr id="73" name="Google Shape;73;p15"/>
+          <p:cNvSpPr/>
+          <p:nvPr/>
+        </p:nvSpPr>
+        <p:spPr>
+          <a:xfrm>
+            <a:off x="8685573" y="254209"/>
+            <a:ext cx="219000" cy="219000"/>
+          </a:xfrm>
+          <a:prstGeom prst="rect">
+            <a:avLst/>
+          </a:prstGeom>
+          <a:solidFill>
+            <a:schemeClr val="dk1"/>
+          </a:solidFill>
+          <a:ln>
+            <a:noFill/>
+          </a:ln>
+        </p:spPr>
+        <p:txBody>
+          <a:bodyPr spcFirstLastPara="1" wrap="square" lIns="91425" tIns="91425" rIns="91425" bIns="91425" anchor="ctr" anchorCtr="0">
+            <a:noAutofit/>
+          </a:bodyPr>
+          <a:lstStyle/>
+          <a:p>
+            <a:pPr marL="0" lvl="0" indent="0" algn="l" rtl="0">
+              <a:spcBef>
+                <a:spcPts val="0"/>
+              </a:spcBef>
+              <a:spcAft>
+                <a:spcPts val="0"/>
+              </a:spcAft>
+              <a:buNone/>
+            </a:pPr>
+            <a:endParaRPr/>
+          </a:p>
+        </p:txBody>
+      </p:sp>
+      <p:sp>
+        <p:nvSpPr>
+          <p:cNvPr id="74" name="Google Shape;74;p15"/>
+          <p:cNvSpPr/>
+          <p:nvPr/>
+        </p:nvSpPr>
+        <p:spPr>
+          <a:xfrm>
+            <a:off x="8685573" y="602134"/>
+            <a:ext cx="219000" cy="219000"/>
+          </a:xfrm>
+          <a:prstGeom prst="rect">
+            <a:avLst/>
+          </a:prstGeom>
+          <a:solidFill>
+            <a:schemeClr val="accent3"/>
+          </a:solidFill>
+          <a:ln>
+            <a:noFill/>
+          </a:ln>
+        </p:spPr>
+        <p:txBody>
+          <a:bodyPr spcFirstLastPara="1" wrap="square" lIns="91425" tIns="91425" rIns="91425" bIns="91425" anchor="ctr" anchorCtr="0">
+            <a:noAutofit/>
+          </a:bodyPr>
+          <a:lstStyle/>
+          <a:p>
+            <a:pPr marL="0" lvl="0" indent="0" algn="l" rtl="0">
+              <a:spcBef>
+                <a:spcPts val="0"/>
+              </a:spcBef>
+              <a:spcAft>
+                <a:spcPts val="0"/>
+              </a:spcAft>
+              <a:buNone/>
+            </a:pPr>
+            <a:endParaRPr/>
+          </a:p>
+        </p:txBody>
+      </p:sp>
+    </p:spTree>
+  </p:cSld>
+  <p:clrMapOvr>
+    <a:overrideClrMapping bg1="dk1" tx1="lt1" bg2="dk2" tx2="lt2" accent1="accent1" accent2="accent2" accent3="accent3" accent4="accent4" accent5="accent5" accent6="accent6" hlink="hlink" folHlink="folHlink"/>
+  </p:clrMapOvr>
+</p:sld>
+</file>
+
+<file path=ppt/slides/slide22.xml><?xml version="1.0" encoding="utf-8"?>
+<p:sld xmlns:a="http://schemas.openxmlformats.org/drawingml/2006/main" xmlns:r="http://schemas.openxmlformats.org/officeDocument/2006/relationships" xmlns:p="http://schemas.openxmlformats.org/presentationml/2006/main">
+  <p:cSld>
+    <p:bg>
+      <p:bgPr>
+        <a:solidFill>
           <a:schemeClr val="bg1"/>
         </a:solidFill>
         <a:effectLst/>
@@ -14851,7 +15712,7 @@
 </p:sld>
 </file>
 
-<file path=ppt/slides/slide21.xml><?xml version="1.0" encoding="utf-8"?>
+<file path=ppt/slides/slide23.xml><?xml version="1.0" encoding="utf-8"?>
 <p:sld xmlns:a="http://schemas.openxmlformats.org/drawingml/2006/main" xmlns:r="http://schemas.openxmlformats.org/officeDocument/2006/relationships" xmlns:p="http://schemas.openxmlformats.org/presentationml/2006/main">
   <p:cSld>
     <p:spTree>

</xml_diff>

<commit_message>
small tweaks to powerpoint
</commit_message>
<xml_diff>
--- a/deliverables/capstone_KH.pptx
+++ b/deliverables/capstone_KH.pptx
@@ -4285,42 +4285,7 @@
             </a:pPr>
             <a:r>
               <a:rPr lang="en-US" dirty="0"/>
-              <a:t>Clear Relationship between Living area and Sale Price</a:t>
-            </a:r>
-          </a:p>
-          <a:p>
-            <a:pPr marL="0" lvl="0" indent="0" algn="l" rtl="0">
-              <a:spcBef>
-                <a:spcPts val="0"/>
-              </a:spcBef>
-              <a:spcAft>
-                <a:spcPts val="0"/>
-              </a:spcAft>
-              <a:buNone/>
-            </a:pPr>
-            <a:endParaRPr lang="en-US" dirty="0"/>
-          </a:p>
-          <a:p>
-            <a:pPr marL="0" lvl="0" indent="0" algn="l" rtl="0">
-              <a:spcBef>
-                <a:spcPts val="0"/>
-              </a:spcBef>
-              <a:spcAft>
-                <a:spcPts val="0"/>
-              </a:spcAft>
-              <a:buNone/>
-            </a:pPr>
-            <a:r>
-              <a:rPr lang="en-US" dirty="0"/>
-              <a:t>- Higher </a:t>
-            </a:r>
-            <a:r>
-              <a:rPr lang="en-US" dirty="0" err="1"/>
-              <a:t>sqft</a:t>
-            </a:r>
-            <a:r>
-              <a:rPr lang="en-US" dirty="0"/>
-              <a:t> homes not only tend to sell for more money, they also tend to be rated higher in terms of overall quality (shown by hue)</a:t>
+              <a:t>Both sexes, average of 1995</a:t>
             </a:r>
           </a:p>
         </p:txBody>
@@ -5841,18 +5806,6 @@
             </a:pPr>
             <a:endParaRPr lang="en-US" dirty="0"/>
           </a:p>
-          <a:p>
-            <a:pPr marL="0" lvl="0" indent="0" algn="l" rtl="0">
-              <a:spcBef>
-                <a:spcPts val="0"/>
-              </a:spcBef>
-              <a:spcAft>
-                <a:spcPts val="0"/>
-              </a:spcAft>
-              <a:buNone/>
-            </a:pPr>
-            <a:endParaRPr lang="en-US" dirty="0"/>
-          </a:p>
         </p:txBody>
       </p:sp>
     </p:spTree>
@@ -6517,6 +6470,228 @@
             </a:pPr>
             <a:endParaRPr lang="en-US" dirty="0"/>
           </a:p>
+          <a:p>
+            <a:pPr marL="0" lvl="0" indent="0" algn="l" rtl="0">
+              <a:spcBef>
+                <a:spcPts val="0"/>
+              </a:spcBef>
+              <a:spcAft>
+                <a:spcPts val="0"/>
+              </a:spcAft>
+              <a:buNone/>
+            </a:pPr>
+            <a:r>
+              <a:rPr lang="en-US" dirty="0"/>
+              <a:t>DEFINITIONS</a:t>
+            </a:r>
+          </a:p>
+          <a:p>
+            <a:pPr marL="0" lvl="0" indent="0" algn="l" rtl="0">
+              <a:spcBef>
+                <a:spcPts val="0"/>
+              </a:spcBef>
+              <a:spcAft>
+                <a:spcPts val="0"/>
+              </a:spcAft>
+              <a:buNone/>
+            </a:pPr>
+            <a:endParaRPr lang="en-US" dirty="0"/>
+          </a:p>
+          <a:p>
+            <a:pPr marL="0" lvl="0" indent="0" algn="l" rtl="0">
+              <a:spcBef>
+                <a:spcPts val="0"/>
+              </a:spcBef>
+              <a:spcAft>
+                <a:spcPts val="0"/>
+              </a:spcAft>
+              <a:buNone/>
+            </a:pPr>
+            <a:r>
+              <a:rPr lang="en-US" sz="1100" b="0" i="0" u="none" strike="noStrike" cap="none" dirty="0">
+                <a:solidFill>
+                  <a:srgbClr val="000000"/>
+                </a:solidFill>
+                <a:effectLst/>
+                <a:latin typeface="Arial"/>
+                <a:ea typeface="Arial"/>
+                <a:cs typeface="Arial"/>
+                <a:sym typeface="Arial"/>
+              </a:rPr>
+              <a:t>"Any" drinking is defined as at least one drink of any alcoholic </a:t>
+            </a:r>
+            <a:r>
+              <a:rPr lang="en-US" sz="1100" b="0" i="0" u="none" strike="noStrike" cap="none" dirty="0" err="1">
+                <a:solidFill>
+                  <a:srgbClr val="000000"/>
+                </a:solidFill>
+                <a:effectLst/>
+                <a:latin typeface="Arial"/>
+                <a:ea typeface="Arial"/>
+                <a:cs typeface="Arial"/>
+                <a:sym typeface="Arial"/>
+              </a:rPr>
+              <a:t>bevarage</a:t>
+            </a:r>
+            <a:r>
+              <a:rPr lang="en-US" sz="1100" b="0" i="0" u="none" strike="noStrike" cap="none" dirty="0">
+                <a:solidFill>
+                  <a:srgbClr val="000000"/>
+                </a:solidFill>
+                <a:effectLst/>
+                <a:latin typeface="Arial"/>
+                <a:ea typeface="Arial"/>
+                <a:cs typeface="Arial"/>
+                <a:sym typeface="Arial"/>
+              </a:rPr>
+              <a:t> in the past 30 days</a:t>
+            </a:r>
+            <a:r>
+              <a:rPr lang="en-US" dirty="0"/>
+              <a:t> – var is age standardized prevalence of “any” drinkers</a:t>
+            </a:r>
+          </a:p>
+          <a:p>
+            <a:pPr marL="0" lvl="0" indent="0" algn="l" rtl="0">
+              <a:spcBef>
+                <a:spcPts val="0"/>
+              </a:spcBef>
+              <a:spcAft>
+                <a:spcPts val="0"/>
+              </a:spcAft>
+              <a:buNone/>
+            </a:pPr>
+            <a:endParaRPr lang="en-US" dirty="0"/>
+          </a:p>
+          <a:p>
+            <a:pPr marL="0" marR="0" lvl="0" indent="0" algn="l" defTabSz="914400" rtl="0" eaLnBrk="1" fontAlgn="auto" latinLnBrk="0" hangingPunct="1">
+              <a:lnSpc>
+                <a:spcPct val="100000"/>
+              </a:lnSpc>
+              <a:spcBef>
+                <a:spcPts val="0"/>
+              </a:spcBef>
+              <a:spcAft>
+                <a:spcPts val="0"/>
+              </a:spcAft>
+              <a:buClr>
+                <a:srgbClr val="000000"/>
+              </a:buClr>
+              <a:buSzPts val="1400"/>
+              <a:buFont typeface="Arial"/>
+              <a:buNone/>
+              <a:tabLst/>
+              <a:defRPr/>
+            </a:pPr>
+            <a:r>
+              <a:rPr lang="en-US" sz="1100" b="0" i="0" u="none" strike="noStrike" cap="none" dirty="0">
+                <a:solidFill>
+                  <a:srgbClr val="000000"/>
+                </a:solidFill>
+                <a:effectLst/>
+                <a:latin typeface="Arial"/>
+                <a:ea typeface="Arial"/>
+                <a:cs typeface="Arial"/>
+                <a:sym typeface="Arial"/>
+              </a:rPr>
+              <a:t>"Heavy" drinking is defined as the consumption, on average, of more than one drink per day for women or two drinks per day for men in the past 30 days</a:t>
+            </a:r>
+            <a:r>
+              <a:rPr lang="en-US" dirty="0"/>
+              <a:t> - var is age standardized prevalence of heavy drinkers</a:t>
+            </a:r>
+          </a:p>
+          <a:p>
+            <a:pPr marL="0" lvl="0" indent="0" algn="l" rtl="0">
+              <a:spcBef>
+                <a:spcPts val="0"/>
+              </a:spcBef>
+              <a:spcAft>
+                <a:spcPts val="0"/>
+              </a:spcAft>
+              <a:buNone/>
+            </a:pPr>
+            <a:endParaRPr lang="en-US" dirty="0"/>
+          </a:p>
+          <a:p>
+            <a:pPr marL="0" lvl="0" indent="0" algn="l" rtl="0">
+              <a:spcBef>
+                <a:spcPts val="0"/>
+              </a:spcBef>
+              <a:spcAft>
+                <a:spcPts val="0"/>
+              </a:spcAft>
+              <a:buNone/>
+            </a:pPr>
+            <a:endParaRPr lang="en-US" dirty="0"/>
+          </a:p>
+          <a:p>
+            <a:pPr marL="0" lvl="0" indent="0" algn="l" rtl="0">
+              <a:spcBef>
+                <a:spcPts val="0"/>
+              </a:spcBef>
+              <a:spcAft>
+                <a:spcPts val="0"/>
+              </a:spcAft>
+              <a:buNone/>
+            </a:pPr>
+            <a:r>
+              <a:rPr lang="en-US" sz="1100" b="0" i="0" u="none" strike="noStrike" cap="none" dirty="0">
+                <a:solidFill>
+                  <a:srgbClr val="000000"/>
+                </a:solidFill>
+                <a:effectLst/>
+                <a:latin typeface="Arial"/>
+                <a:ea typeface="Arial"/>
+                <a:cs typeface="Arial"/>
+                <a:sym typeface="Arial"/>
+              </a:rPr>
+              <a:t>"Binge" drinking is defined as the consumption of more than four drinks for women or five drinks for men on a single occasion at least once in the past 30 days</a:t>
+            </a:r>
+            <a:r>
+              <a:rPr lang="en-US" dirty="0"/>
+              <a:t> – var is age standardized prevalence of binge drinkers</a:t>
+            </a:r>
+          </a:p>
+          <a:p>
+            <a:pPr marL="0" lvl="0" indent="0" algn="l" rtl="0">
+              <a:spcBef>
+                <a:spcPts val="0"/>
+              </a:spcBef>
+              <a:spcAft>
+                <a:spcPts val="0"/>
+              </a:spcAft>
+              <a:buNone/>
+            </a:pPr>
+            <a:endParaRPr lang="en-US" dirty="0"/>
+          </a:p>
+          <a:p>
+            <a:pPr marL="0" lvl="0" indent="0" algn="l" rtl="0">
+              <a:spcBef>
+                <a:spcPts val="0"/>
+              </a:spcBef>
+              <a:spcAft>
+                <a:spcPts val="0"/>
+              </a:spcAft>
+              <a:buNone/>
+            </a:pPr>
+            <a:r>
+              <a:rPr lang="en-US" dirty="0"/>
+              <a:t>Proportion of Binge and Heavy refers to the proportion of all drinkers who are heavy or binge drinkers</a:t>
+            </a:r>
+          </a:p>
+          <a:p>
+            <a:pPr marL="0" lvl="0" indent="0" algn="l" rtl="0">
+              <a:spcBef>
+                <a:spcPts val="0"/>
+              </a:spcBef>
+              <a:spcAft>
+                <a:spcPts val="0"/>
+              </a:spcAft>
+              <a:buNone/>
+            </a:pPr>
+            <a:endParaRPr lang="en-US" dirty="0"/>
+          </a:p>
         </p:txBody>
       </p:sp>
     </p:spTree>
@@ -7035,6 +7210,122 @@
             <a:r>
               <a:rPr lang="en-US" dirty="0"/>
               <a:t>Clearly, there is some regionality to these rates</a:t>
+            </a:r>
+          </a:p>
+          <a:p>
+            <a:pPr marL="0" lvl="0" indent="0" algn="l" rtl="0">
+              <a:spcBef>
+                <a:spcPts val="0"/>
+              </a:spcBef>
+              <a:spcAft>
+                <a:spcPts val="0"/>
+              </a:spcAft>
+              <a:buNone/>
+            </a:pPr>
+            <a:endParaRPr lang="en-US" dirty="0"/>
+          </a:p>
+          <a:p>
+            <a:pPr marL="0" lvl="0" indent="0" algn="l" rtl="0">
+              <a:spcBef>
+                <a:spcPts val="0"/>
+              </a:spcBef>
+              <a:spcAft>
+                <a:spcPts val="0"/>
+              </a:spcAft>
+              <a:buNone/>
+            </a:pPr>
+            <a:r>
+              <a:rPr lang="en-US" dirty="0"/>
+              <a:t>States with the highest self harm mortality rates include Nevada, Alaska, New Mexico, </a:t>
+            </a:r>
+            <a:r>
+              <a:rPr lang="en-US" dirty="0" err="1"/>
+              <a:t>Whoming</a:t>
+            </a:r>
+            <a:r>
+              <a:rPr lang="en-US" dirty="0"/>
+              <a:t>, Montana, Colorado and Oregon</a:t>
+            </a:r>
+          </a:p>
+          <a:p>
+            <a:pPr marL="0" lvl="0" indent="0" algn="l" rtl="0">
+              <a:spcBef>
+                <a:spcPts val="0"/>
+              </a:spcBef>
+              <a:spcAft>
+                <a:spcPts val="0"/>
+              </a:spcAft>
+              <a:buNone/>
+            </a:pPr>
+            <a:endParaRPr lang="en-US" dirty="0"/>
+          </a:p>
+          <a:p>
+            <a:pPr marL="0" lvl="0" indent="0" algn="l" rtl="0">
+              <a:spcBef>
+                <a:spcPts val="0"/>
+              </a:spcBef>
+              <a:spcAft>
+                <a:spcPts val="0"/>
+              </a:spcAft>
+              <a:buNone/>
+            </a:pPr>
+            <a:r>
+              <a:rPr lang="en-US" dirty="0"/>
+              <a:t>Lots of states we think of as “rural” on the gulf coast don’t rank in the top half</a:t>
+            </a:r>
+          </a:p>
+          <a:p>
+            <a:pPr marL="0" lvl="0" indent="0" algn="l" rtl="0">
+              <a:spcBef>
+                <a:spcPts val="0"/>
+              </a:spcBef>
+              <a:spcAft>
+                <a:spcPts val="0"/>
+              </a:spcAft>
+              <a:buNone/>
+            </a:pPr>
+            <a:endParaRPr lang="en-US" dirty="0"/>
+          </a:p>
+          <a:p>
+            <a:pPr marL="0" lvl="0" indent="0" algn="l" rtl="0">
+              <a:spcBef>
+                <a:spcPts val="0"/>
+              </a:spcBef>
+              <a:spcAft>
+                <a:spcPts val="0"/>
+              </a:spcAft>
+              <a:buNone/>
+            </a:pPr>
+            <a:r>
+              <a:rPr lang="en-US" dirty="0"/>
+              <a:t>The lowest 6 or 7 states were almost exclusively east coast states</a:t>
+            </a:r>
+          </a:p>
+          <a:p>
+            <a:pPr marL="0" lvl="0" indent="0" algn="l" rtl="0">
+              <a:spcBef>
+                <a:spcPts val="0"/>
+              </a:spcBef>
+              <a:spcAft>
+                <a:spcPts val="0"/>
+              </a:spcAft>
+              <a:buNone/>
+            </a:pPr>
+            <a:endParaRPr lang="en-US" dirty="0"/>
+          </a:p>
+          <a:p>
+            <a:pPr marL="0" lvl="0" indent="0" algn="l" rtl="0">
+              <a:spcBef>
+                <a:spcPts val="0"/>
+              </a:spcBef>
+              <a:spcAft>
+                <a:spcPts val="0"/>
+              </a:spcAft>
+              <a:buNone/>
+            </a:pPr>
+            <a:r>
+              <a:rPr lang="en-US" dirty="0"/>
+              <a:t>California ranked in top 10 for women, but was much lower for men</a:t>
             </a:r>
           </a:p>
         </p:txBody>
@@ -11134,9 +11425,6 @@
               </a:rPr>
               <a:t>Kade Higgins</a:t>
             </a:r>
-            <a:endParaRPr lang="en-US" i="1">
-              <a:latin typeface="+mn-lt"/>
-            </a:endParaRPr>
           </a:p>
         </p:txBody>
       </p:sp>
@@ -12772,7 +13060,7 @@
             </a:r>
             <a:r>
               <a:rPr lang="en-US" b="1" i="1" dirty="0"/>
-              <a:t>32.16</a:t>
+              <a:t>5.67</a:t>
             </a:r>
           </a:p>
         </p:txBody>
@@ -13162,7 +13450,7 @@
                   <a:schemeClr val="tx1"/>
                 </a:solidFill>
               </a:rPr>
-              <a:t>15.25</a:t>
+              <a:t>3.9</a:t>
             </a:r>
           </a:p>
         </p:txBody>
@@ -14167,7 +14455,7 @@
             </a:r>
             <a:r>
               <a:rPr lang="en-US" sz="2800" spc="200" dirty="0"/>
-              <a:t> &amp; unemployment</a:t>
+              <a:t> &amp; unemployment (4 cluster)</a:t>
             </a:r>
           </a:p>
         </p:txBody>
@@ -14186,16 +14474,15 @@
           </p:cNvPicPr>
           <p:nvPr/>
         </p:nvPicPr>
-        <p:blipFill>
+        <p:blipFill rotWithShape="1">
           <a:blip r:embed="rId3"/>
-          <a:stretch>
-            <a:fillRect/>
-          </a:stretch>
+          <a:srcRect b="8248"/>
+          <a:stretch/>
         </p:blipFill>
         <p:spPr>
           <a:xfrm>
-            <a:off x="2420870" y="720088"/>
-            <a:ext cx="4302260" cy="2667401"/>
+            <a:off x="2055572" y="254126"/>
+            <a:ext cx="5603904" cy="3187850"/>
           </a:xfrm>
           <a:prstGeom prst="rect">
             <a:avLst/>
@@ -14916,7 +15203,7 @@
             </a:r>
             <a:r>
               <a:rPr lang="en-US" sz="2800" spc="200" dirty="0"/>
-              <a:t> Binge Use &amp; unemployment</a:t>
+              <a:t> Binge Use &amp; unemployment (10 Cluster)</a:t>
             </a:r>
           </a:p>
         </p:txBody>
@@ -15207,7 +15494,7 @@
         </p:spPr>
         <p:txBody>
           <a:bodyPr spcFirstLastPara="1" vert="horz" lIns="91440" tIns="45720" rIns="91440" bIns="45720" rtlCol="0" anchorCtr="0">
-            <a:normAutofit lnSpcReduction="10000"/>
+            <a:normAutofit/>
           </a:bodyPr>
           <a:lstStyle/>
           <a:p>
@@ -15225,20 +15512,6 @@
             </a:r>
           </a:p>
           <a:p>
-            <a:pPr marL="0" lvl="0" indent="-228600" defTabSz="914400">
-              <a:spcBef>
-                <a:spcPts val="1000"/>
-              </a:spcBef>
-              <a:spcAft>
-                <a:spcPts val="0"/>
-              </a:spcAft>
-            </a:pPr>
-            <a:r>
-              <a:rPr lang="en-US" dirty="0"/>
-              <a:t>If Univariate Models represent our Baseline</a:t>
-            </a:r>
-          </a:p>
-          <a:p>
             <a:pPr marL="171450" lvl="1" indent="-228600" defTabSz="914400">
               <a:spcBef>
                 <a:spcPts val="1000"/>
@@ -15279,7 +15552,7 @@
             </a:pPr>
             <a:r>
               <a:rPr lang="en-US" i="1" dirty="0"/>
-              <a:t>Get more complete data, built out </a:t>
+              <a:t>Get more complete data, build out </a:t>
             </a:r>
             <a:r>
               <a:rPr lang="en-US" i="1" dirty="0" err="1"/>

</xml_diff>